<commit_message>
Updated Psychometric model slides
</commit_message>
<xml_diff>
--- a/Day1/Day1_03_Psychometric Model.pptx
+++ b/Day1/Day1_03_Psychometric Model.pptx
@@ -29,8 +29,8 @@
     <p:sldId id="493" r:id="rId21"/>
     <p:sldId id="495" r:id="rId22"/>
     <p:sldId id="479" r:id="rId23"/>
-    <p:sldId id="496" r:id="rId24"/>
-    <p:sldId id="326" r:id="rId25"/>
+    <p:sldId id="326" r:id="rId24"/>
+    <p:sldId id="496" r:id="rId25"/>
     <p:sldId id="437" r:id="rId26"/>
     <p:sldId id="421" r:id="rId27"/>
   </p:sldIdLst>
@@ -6228,7 +6228,7 @@
             <a:fld id="{B54DC83E-89B8-4806-9A94-7D2BAA520DC6}" type="slidenum">
               <a:rPr lang="en-US" smtClean="0"/>
               <a:pPr/>
-              <a:t>19</a:t>
+              <a:t>18</a:t>
             </a:fld>
             <a:endParaRPr lang="en-US" dirty="0"/>
           </a:p>
@@ -22572,8 +22572,8 @@
           </a:p>
         </p:txBody>
       </p:sp>
-      <mc:AlternateContent xmlns:mc="http://schemas.openxmlformats.org/markup-compatibility/2006" xmlns:a14="http://schemas.microsoft.com/office/drawing/2010/main">
-        <mc:Choice Requires="a14">
+      <mc:AlternateContent xmlns:mc="http://schemas.openxmlformats.org/markup-compatibility/2006">
+        <mc:Choice xmlns:a14="http://schemas.microsoft.com/office/drawing/2010/main" Requires="a14">
           <p:sp>
             <p:nvSpPr>
               <p:cNvPr id="17" name="Content Placeholder 16"/>
@@ -22841,7 +22841,15 @@
                 </a14:m>
                 <a:r>
                   <a:rPr lang="en-US" sz="2200" dirty="0"/>
-                  <a:t> are is the observed responses to survey items </a:t>
+                  <a:t> </a:t>
+                </a:r>
+                <a:r>
+                  <a:rPr lang="en-US" sz="2200"/>
+                  <a:t>are the </a:t>
+                </a:r>
+                <a:r>
+                  <a:rPr lang="en-US" sz="2200" dirty="0"/>
+                  <a:t>observed responses to survey items </a:t>
                 </a:r>
               </a:p>
               <a:p>
@@ -22993,7 +23001,7 @@
             </p:txBody>
           </p:sp>
         </mc:Choice>
-        <mc:Fallback xmlns="">
+        <mc:Fallback>
           <p:sp>
             <p:nvSpPr>
               <p:cNvPr id="17" name="Content Placeholder 16"/>
@@ -26008,7 +26016,7 @@
                   </a:outerShdw>
                 </a:effectLst>
               </a:rPr>
-              <a:t>measure variance </a:t>
+              <a:t>measurement variance </a:t>
             </a:r>
             <a:r>
               <a:rPr lang="en-US" dirty="0"/>
@@ -27162,13 +27170,7 @@
       </p:grpSpPr>
       <p:sp>
         <p:nvSpPr>
-          <p:cNvPr id="2" name="Title 1">
-            <a:extLst>
-              <a:ext uri="{FF2B5EF4-FFF2-40B4-BE49-F238E27FC236}">
-                <a16:creationId xmlns:a16="http://schemas.microsoft.com/office/drawing/2014/main" id="{9E41D124-243C-4C8F-AF6F-0AC4053A4D39}"/>
-              </a:ext>
-            </a:extLst>
-          </p:cNvPr>
+          <p:cNvPr id="2" name="Title 1"/>
           <p:cNvSpPr>
             <a:spLocks noGrp="1"/>
           </p:cNvSpPr>
@@ -27176,27 +27178,28 @@
             <p:ph type="title"/>
           </p:nvPr>
         </p:nvSpPr>
-        <p:spPr/>
+        <p:spPr>
+          <a:xfrm>
+            <a:off x="457200" y="213947"/>
+            <a:ext cx="7924800" cy="762000"/>
+          </a:xfrm>
+        </p:spPr>
         <p:txBody>
-          <a:bodyPr/>
+          <a:bodyPr>
+            <a:normAutofit fontScale="90000"/>
+          </a:bodyPr>
           <a:lstStyle/>
           <a:p>
             <a:r>
               <a:rPr lang="en-US" dirty="0"/>
-              <a:t>Homework</a:t>
+              <a:t>Tools analyzing data with Plausible Values</a:t>
             </a:r>
           </a:p>
         </p:txBody>
       </p:sp>
       <p:sp>
         <p:nvSpPr>
-          <p:cNvPr id="3" name="Content Placeholder 2">
-            <a:extLst>
-              <a:ext uri="{FF2B5EF4-FFF2-40B4-BE49-F238E27FC236}">
-                <a16:creationId xmlns:a16="http://schemas.microsoft.com/office/drawing/2014/main" id="{640AEC3A-76EE-4E61-ACB2-7C8FD8CA264B}"/>
-              </a:ext>
-            </a:extLst>
-          </p:cNvPr>
+          <p:cNvPr id="3" name="Content Placeholder 2"/>
           <p:cNvSpPr>
             <a:spLocks noGrp="1"/>
           </p:cNvSpPr>
@@ -27207,193 +27210,62 @@
         <p:spPr/>
         <p:txBody>
           <a:bodyPr>
-            <a:normAutofit/>
+            <a:normAutofit fontScale="92500"/>
           </a:bodyPr>
           <a:lstStyle/>
           <a:p>
             <a:r>
-              <a:rPr lang="en-US" dirty="0"/>
-              <a:t>Download and install R and R studio</a:t>
-            </a:r>
-          </a:p>
-          <a:p>
-            <a:r>
-              <a:rPr lang="en-US" dirty="0"/>
-              <a:t>Download TIMSS data 2019-2011 using </a:t>
-            </a:r>
-            <a:r>
-              <a:rPr lang="en-US" dirty="0" err="1"/>
-              <a:t>EdSurvey</a:t>
-            </a:r>
-            <a:r>
-              <a:rPr lang="en-US" dirty="0"/>
-              <a:t> function “</a:t>
-            </a:r>
-            <a:r>
-              <a:rPr lang="en-US" dirty="0" err="1"/>
-              <a:t>downloadTIMSS</a:t>
-            </a:r>
-            <a:r>
-              <a:rPr lang="en-US" dirty="0"/>
-              <a:t>”</a:t>
-            </a:r>
-          </a:p>
-          <a:p>
-            <a:pPr marL="320040" lvl="1" indent="0">
-              <a:buNone/>
-            </a:pPr>
-            <a:r>
-              <a:rPr lang="en-US" sz="1800" b="0" i="0" dirty="0" err="1">
-                <a:solidFill>
-                  <a:srgbClr val="333333"/>
-                </a:solidFill>
-                <a:effectLst/>
-                <a:latin typeface="Courier New" panose="02070309020205020404" pitchFamily="49" charset="0"/>
-              </a:rPr>
-              <a:t>install.packages</a:t>
-            </a:r>
-            <a:r>
-              <a:rPr lang="en-US" sz="1800" b="0" i="0" dirty="0">
-                <a:solidFill>
-                  <a:srgbClr val="333333"/>
-                </a:solidFill>
-                <a:effectLst/>
-                <a:latin typeface="Courier New" panose="02070309020205020404" pitchFamily="49" charset="0"/>
-              </a:rPr>
-              <a:t>("</a:t>
-            </a:r>
-            <a:r>
-              <a:rPr lang="en-US" sz="1800" b="0" i="0" dirty="0" err="1">
-                <a:solidFill>
-                  <a:srgbClr val="333333"/>
-                </a:solidFill>
-                <a:effectLst/>
-                <a:latin typeface="Courier New" panose="02070309020205020404" pitchFamily="49" charset="0"/>
+              <a:rPr lang="en-US" sz="2800" i="1" dirty="0">
+                <a:hlinkClick r:id="rId3"/>
               </a:rPr>
               <a:t>EdSurvey</a:t>
             </a:r>
             <a:r>
-              <a:rPr lang="en-US" sz="1800" b="0" i="0" dirty="0">
-                <a:solidFill>
-                  <a:srgbClr val="333333"/>
-                </a:solidFill>
-                <a:effectLst/>
-                <a:latin typeface="Courier New" panose="02070309020205020404" pitchFamily="49" charset="0"/>
+              <a:rPr lang="en-US" sz="2800" dirty="0">
+                <a:hlinkClick r:id="rId3"/>
               </a:rPr>
-              <a:t>")</a:t>
-            </a:r>
-          </a:p>
-          <a:p>
-            <a:pPr marL="320040" lvl="1" indent="0">
-              <a:buNone/>
-            </a:pPr>
-            <a:r>
-              <a:rPr lang="en-US" sz="1800" b="0" i="0" dirty="0">
-                <a:solidFill>
-                  <a:srgbClr val="333333"/>
-                </a:solidFill>
-                <a:effectLst/>
-                <a:latin typeface="Courier New" panose="02070309020205020404" pitchFamily="49" charset="0"/>
+              <a:t> package </a:t>
+            </a:r>
+            <a:r>
+              <a:rPr lang="en-US" sz="2800" dirty="0"/>
+              <a:t>in R is designed to analyze NCES data with plausible values and complex sampling design.</a:t>
+            </a:r>
+          </a:p>
+          <a:p>
+            <a:r>
+              <a:rPr lang="en-US" sz="2800" i="1" dirty="0">
+                <a:hlinkClick r:id="rId4"/>
               </a:rPr>
-              <a:t>library(</a:t>
-            </a:r>
-            <a:r>
-              <a:rPr lang="en-US" sz="1800" b="0" i="0" dirty="0" err="1">
-                <a:solidFill>
-                  <a:srgbClr val="333333"/>
-                </a:solidFill>
-                <a:effectLst/>
-                <a:latin typeface="Courier New" panose="02070309020205020404" pitchFamily="49" charset="0"/>
+              <a:t>Dire</a:t>
+            </a:r>
+            <a:r>
+              <a:rPr lang="en-US" sz="2800" dirty="0">
+                <a:hlinkClick r:id="rId4"/>
               </a:rPr>
-              <a:t>EdSurvey</a:t>
-            </a:r>
-            <a:r>
-              <a:rPr lang="en-US" sz="1800" b="0" i="0" dirty="0">
-                <a:solidFill>
-                  <a:srgbClr val="333333"/>
-                </a:solidFill>
-                <a:effectLst/>
-                <a:latin typeface="Courier New" panose="02070309020205020404" pitchFamily="49" charset="0"/>
-              </a:rPr>
-              <a:t>)</a:t>
-            </a:r>
-          </a:p>
-          <a:p>
-            <a:pPr marL="320040" lvl="1" indent="0">
-              <a:buNone/>
-            </a:pPr>
-            <a:r>
-              <a:rPr lang="en-US" sz="1800" b="0" i="0" dirty="0" err="1">
-                <a:solidFill>
-                  <a:srgbClr val="333333"/>
-                </a:solidFill>
-                <a:effectLst/>
-                <a:latin typeface="Courier New" panose="02070309020205020404" pitchFamily="49" charset="0"/>
-              </a:rPr>
-              <a:t>downloadTIMSS</a:t>
-            </a:r>
-            <a:r>
-              <a:rPr lang="en-US" sz="1800" b="0" i="0" dirty="0">
-                <a:solidFill>
-                  <a:srgbClr val="333333"/>
-                </a:solidFill>
-                <a:effectLst/>
-                <a:latin typeface="Courier New" panose="02070309020205020404" pitchFamily="49" charset="0"/>
-              </a:rPr>
-              <a:t>(years = c(</a:t>
-            </a:r>
-            <a:r>
-              <a:rPr lang="en-US" sz="1800" b="0" i="0" dirty="0">
-                <a:solidFill>
-                  <a:srgbClr val="008080"/>
-                </a:solidFill>
-                <a:effectLst/>
-                <a:latin typeface="Courier New" panose="02070309020205020404" pitchFamily="49" charset="0"/>
-              </a:rPr>
-              <a:t>2019, 2015, 2011</a:t>
-            </a:r>
-            <a:r>
-              <a:rPr lang="en-US" sz="1800" b="0" i="0" dirty="0">
-                <a:solidFill>
-                  <a:srgbClr val="333333"/>
-                </a:solidFill>
-                <a:effectLst/>
-                <a:latin typeface="Courier New" panose="02070309020205020404" pitchFamily="49" charset="0"/>
-              </a:rPr>
-              <a:t>), root = </a:t>
-            </a:r>
-            <a:r>
-              <a:rPr lang="en-US" sz="1800" b="0" i="0" dirty="0">
-                <a:solidFill>
-                  <a:srgbClr val="DD1144"/>
-                </a:solidFill>
-                <a:effectLst/>
-                <a:latin typeface="Courier New" panose="02070309020205020404" pitchFamily="49" charset="0"/>
-              </a:rPr>
-              <a:t>"C:/"</a:t>
-            </a:r>
-            <a:r>
-              <a:rPr lang="en-US" sz="1800" b="0" i="0" dirty="0">
-                <a:solidFill>
-                  <a:srgbClr val="333333"/>
-                </a:solidFill>
-                <a:effectLst/>
-                <a:latin typeface="Courier New" panose="02070309020205020404" pitchFamily="49" charset="0"/>
-              </a:rPr>
-              <a:t>)</a:t>
+              <a:t> package </a:t>
+            </a:r>
+            <a:r>
+              <a:rPr lang="en-US" sz="2800" dirty="0"/>
+              <a:t>in R analyze NAEP and TIMSS data and conduct direct estimation for students’ scale scores.</a:t>
+            </a:r>
+          </a:p>
+          <a:p>
+            <a:r>
+              <a:rPr lang="en-US" sz="2800" dirty="0"/>
+              <a:t>Standard statistical software packages can also be used, such as SAS, Stata, or SPSS</a:t>
+            </a:r>
+          </a:p>
+          <a:p>
+            <a:r>
+              <a:rPr lang="en-US" sz="2800" dirty="0"/>
+              <a:t>For simple analyses (e.g. comparing group means, simple correlations, summary tables), check out the NAEP Data Explorer and International Data Explorer.</a:t>
             </a:r>
           </a:p>
         </p:txBody>
       </p:sp>
       <p:sp>
         <p:nvSpPr>
-          <p:cNvPr id="4" name="Slide Number Placeholder 3">
-            <a:extLst>
-              <a:ext uri="{FF2B5EF4-FFF2-40B4-BE49-F238E27FC236}">
-                <a16:creationId xmlns:a16="http://schemas.microsoft.com/office/drawing/2014/main" id="{6DDBF39B-C591-4576-BDA4-9426D4CADA31}"/>
-              </a:ext>
-            </a:extLst>
-          </p:cNvPr>
+          <p:cNvPr id="4" name="Slide Number Placeholder 3"/>
           <p:cNvSpPr>
             <a:spLocks noGrp="1"/>
           </p:cNvSpPr>
@@ -27401,7 +27273,12 @@
             <p:ph type="sldNum" sz="quarter" idx="10"/>
           </p:nvPr>
         </p:nvSpPr>
-        <p:spPr/>
+        <p:spPr>
+          <a:xfrm>
+            <a:off x="11938634" y="6594383"/>
+            <a:ext cx="131446" cy="153888"/>
+          </a:xfrm>
+        </p:spPr>
         <p:txBody>
           <a:bodyPr/>
           <a:lstStyle/>
@@ -27423,7 +27300,7 @@
     </p:spTree>
     <p:extLst>
       <p:ext uri="{BB962C8B-B14F-4D97-AF65-F5344CB8AC3E}">
-        <p14:creationId xmlns:p14="http://schemas.microsoft.com/office/powerpoint/2010/main" val="3000605741"/>
+        <p14:creationId xmlns:p14="http://schemas.microsoft.com/office/powerpoint/2010/main" val="2884320113"/>
       </p:ext>
     </p:extLst>
   </p:cSld>
@@ -27452,7 +27329,13 @@
       </p:grpSpPr>
       <p:sp>
         <p:nvSpPr>
-          <p:cNvPr id="2" name="Title 1"/>
+          <p:cNvPr id="2" name="Title 1">
+            <a:extLst>
+              <a:ext uri="{FF2B5EF4-FFF2-40B4-BE49-F238E27FC236}">
+                <a16:creationId xmlns:a16="http://schemas.microsoft.com/office/drawing/2014/main" id="{9E41D124-243C-4C8F-AF6F-0AC4053A4D39}"/>
+              </a:ext>
+            </a:extLst>
+          </p:cNvPr>
           <p:cNvSpPr>
             <a:spLocks noGrp="1"/>
           </p:cNvSpPr>
@@ -27460,28 +27343,27 @@
             <p:ph type="title"/>
           </p:nvPr>
         </p:nvSpPr>
-        <p:spPr>
-          <a:xfrm>
-            <a:off x="457200" y="213947"/>
-            <a:ext cx="7924800" cy="762000"/>
-          </a:xfrm>
-        </p:spPr>
+        <p:spPr/>
         <p:txBody>
-          <a:bodyPr>
-            <a:normAutofit fontScale="90000"/>
-          </a:bodyPr>
+          <a:bodyPr/>
           <a:lstStyle/>
           <a:p>
             <a:r>
               <a:rPr lang="en-US" dirty="0"/>
-              <a:t>Tools analyzing data with Plausible Values</a:t>
+              <a:t>Homework</a:t>
             </a:r>
           </a:p>
         </p:txBody>
       </p:sp>
       <p:sp>
         <p:nvSpPr>
-          <p:cNvPr id="3" name="Content Placeholder 2"/>
+          <p:cNvPr id="3" name="Content Placeholder 2">
+            <a:extLst>
+              <a:ext uri="{FF2B5EF4-FFF2-40B4-BE49-F238E27FC236}">
+                <a16:creationId xmlns:a16="http://schemas.microsoft.com/office/drawing/2014/main" id="{640AEC3A-76EE-4E61-ACB2-7C8FD8CA264B}"/>
+              </a:ext>
+            </a:extLst>
+          </p:cNvPr>
           <p:cNvSpPr>
             <a:spLocks noGrp="1"/>
           </p:cNvSpPr>
@@ -27492,62 +27374,193 @@
         <p:spPr/>
         <p:txBody>
           <a:bodyPr>
-            <a:normAutofit fontScale="92500"/>
+            <a:normAutofit/>
           </a:bodyPr>
           <a:lstStyle/>
           <a:p>
             <a:r>
-              <a:rPr lang="en-US" sz="2800" i="1" dirty="0">
-                <a:hlinkClick r:id="rId3"/>
+              <a:rPr lang="en-US" dirty="0"/>
+              <a:t>Download and install R and R studio</a:t>
+            </a:r>
+          </a:p>
+          <a:p>
+            <a:r>
+              <a:rPr lang="en-US" dirty="0"/>
+              <a:t>Download TIMSS data 2019-2011 using </a:t>
+            </a:r>
+            <a:r>
+              <a:rPr lang="en-US" dirty="0" err="1"/>
+              <a:t>EdSurvey</a:t>
+            </a:r>
+            <a:r>
+              <a:rPr lang="en-US" dirty="0"/>
+              <a:t> function “</a:t>
+            </a:r>
+            <a:r>
+              <a:rPr lang="en-US" dirty="0" err="1"/>
+              <a:t>downloadTIMSS</a:t>
+            </a:r>
+            <a:r>
+              <a:rPr lang="en-US" dirty="0"/>
+              <a:t>”</a:t>
+            </a:r>
+          </a:p>
+          <a:p>
+            <a:pPr marL="320040" lvl="1" indent="0">
+              <a:buNone/>
+            </a:pPr>
+            <a:r>
+              <a:rPr lang="en-US" sz="1800" b="0" i="0" dirty="0" err="1">
+                <a:solidFill>
+                  <a:srgbClr val="333333"/>
+                </a:solidFill>
+                <a:effectLst/>
+                <a:latin typeface="Courier New" panose="02070309020205020404" pitchFamily="49" charset="0"/>
+              </a:rPr>
+              <a:t>install.packages</a:t>
+            </a:r>
+            <a:r>
+              <a:rPr lang="en-US" sz="1800" b="0" i="0" dirty="0">
+                <a:solidFill>
+                  <a:srgbClr val="333333"/>
+                </a:solidFill>
+                <a:effectLst/>
+                <a:latin typeface="Courier New" panose="02070309020205020404" pitchFamily="49" charset="0"/>
+              </a:rPr>
+              <a:t>("</a:t>
+            </a:r>
+            <a:r>
+              <a:rPr lang="en-US" sz="1800" b="0" i="0" dirty="0" err="1">
+                <a:solidFill>
+                  <a:srgbClr val="333333"/>
+                </a:solidFill>
+                <a:effectLst/>
+                <a:latin typeface="Courier New" panose="02070309020205020404" pitchFamily="49" charset="0"/>
               </a:rPr>
               <a:t>EdSurvey</a:t>
             </a:r>
             <a:r>
-              <a:rPr lang="en-US" sz="2800" dirty="0">
-                <a:hlinkClick r:id="rId3"/>
+              <a:rPr lang="en-US" sz="1800" b="0" i="0" dirty="0">
+                <a:solidFill>
+                  <a:srgbClr val="333333"/>
+                </a:solidFill>
+                <a:effectLst/>
+                <a:latin typeface="Courier New" panose="02070309020205020404" pitchFamily="49" charset="0"/>
               </a:rPr>
-              <a:t> package </a:t>
-            </a:r>
-            <a:r>
-              <a:rPr lang="en-US" sz="2800" dirty="0"/>
-              <a:t>in R is designed to analyze NCES data with plausible values and complex sampling design.</a:t>
-            </a:r>
-          </a:p>
-          <a:p>
-            <a:r>
-              <a:rPr lang="en-US" sz="2800" i="1" dirty="0">
-                <a:hlinkClick r:id="rId4"/>
+              <a:t>")</a:t>
+            </a:r>
+          </a:p>
+          <a:p>
+            <a:pPr marL="320040" lvl="1" indent="0">
+              <a:buNone/>
+            </a:pPr>
+            <a:r>
+              <a:rPr lang="en-US" sz="1800" b="0" i="0" dirty="0">
+                <a:solidFill>
+                  <a:srgbClr val="333333"/>
+                </a:solidFill>
+                <a:effectLst/>
+                <a:latin typeface="Courier New" panose="02070309020205020404" pitchFamily="49" charset="0"/>
               </a:rPr>
-              <a:t>Dire</a:t>
-            </a:r>
-            <a:r>
-              <a:rPr lang="en-US" sz="2800" dirty="0">
-                <a:hlinkClick r:id="rId4"/>
+              <a:t>library(</a:t>
+            </a:r>
+            <a:r>
+              <a:rPr lang="en-US" sz="1800" b="0" i="0" dirty="0" err="1">
+                <a:solidFill>
+                  <a:srgbClr val="333333"/>
+                </a:solidFill>
+                <a:effectLst/>
+                <a:latin typeface="Courier New" panose="02070309020205020404" pitchFamily="49" charset="0"/>
               </a:rPr>
-              <a:t> package </a:t>
-            </a:r>
-            <a:r>
-              <a:rPr lang="en-US" sz="2800" dirty="0"/>
-              <a:t>in R analyze NAEP and TIMSS data and conduct direct estimation for students’ scale scores.</a:t>
-            </a:r>
-          </a:p>
-          <a:p>
-            <a:r>
-              <a:rPr lang="en-US" sz="2800" dirty="0"/>
-              <a:t>Standard statistical software packages can also be used, such as SAS, Stata, or SPSS</a:t>
-            </a:r>
-          </a:p>
-          <a:p>
-            <a:r>
-              <a:rPr lang="en-US" sz="2800" dirty="0"/>
-              <a:t>For simple analyses (e.g. comparing group means, simple correlations, summary tables), check out the NAEP Data Explorer and International Data Explorer.</a:t>
+              <a:t>EdSurvey</a:t>
+            </a:r>
+            <a:r>
+              <a:rPr lang="en-US" sz="1800" b="0" i="0" dirty="0">
+                <a:solidFill>
+                  <a:srgbClr val="333333"/>
+                </a:solidFill>
+                <a:effectLst/>
+                <a:latin typeface="Courier New" panose="02070309020205020404" pitchFamily="49" charset="0"/>
+              </a:rPr>
+              <a:t>)</a:t>
+            </a:r>
+          </a:p>
+          <a:p>
+            <a:pPr marL="320040" lvl="1" indent="0">
+              <a:buNone/>
+            </a:pPr>
+            <a:r>
+              <a:rPr lang="en-US" sz="1800" b="0" i="0" dirty="0" err="1">
+                <a:solidFill>
+                  <a:srgbClr val="333333"/>
+                </a:solidFill>
+                <a:effectLst/>
+                <a:latin typeface="Courier New" panose="02070309020205020404" pitchFamily="49" charset="0"/>
+              </a:rPr>
+              <a:t>downloadTIMSS</a:t>
+            </a:r>
+            <a:r>
+              <a:rPr lang="en-US" sz="1800" b="0" i="0" dirty="0">
+                <a:solidFill>
+                  <a:srgbClr val="333333"/>
+                </a:solidFill>
+                <a:effectLst/>
+                <a:latin typeface="Courier New" panose="02070309020205020404" pitchFamily="49" charset="0"/>
+              </a:rPr>
+              <a:t>(years = c(</a:t>
+            </a:r>
+            <a:r>
+              <a:rPr lang="en-US" sz="1800" b="0" i="0" dirty="0">
+                <a:solidFill>
+                  <a:srgbClr val="008080"/>
+                </a:solidFill>
+                <a:effectLst/>
+                <a:latin typeface="Courier New" panose="02070309020205020404" pitchFamily="49" charset="0"/>
+              </a:rPr>
+              <a:t>2019, 2015, 2011</a:t>
+            </a:r>
+            <a:r>
+              <a:rPr lang="en-US" sz="1800" b="0" i="0" dirty="0">
+                <a:solidFill>
+                  <a:srgbClr val="333333"/>
+                </a:solidFill>
+                <a:effectLst/>
+                <a:latin typeface="Courier New" panose="02070309020205020404" pitchFamily="49" charset="0"/>
+              </a:rPr>
+              <a:t>), root = </a:t>
+            </a:r>
+            <a:r>
+              <a:rPr lang="en-US" sz="1800" b="0" i="0" dirty="0">
+                <a:solidFill>
+                  <a:srgbClr val="DD1144"/>
+                </a:solidFill>
+                <a:effectLst/>
+                <a:latin typeface="Courier New" panose="02070309020205020404" pitchFamily="49" charset="0"/>
+              </a:rPr>
+              <a:t>"C:/"</a:t>
+            </a:r>
+            <a:r>
+              <a:rPr lang="en-US" sz="1800" b="0" i="0" dirty="0">
+                <a:solidFill>
+                  <a:srgbClr val="333333"/>
+                </a:solidFill>
+                <a:effectLst/>
+                <a:latin typeface="Courier New" panose="02070309020205020404" pitchFamily="49" charset="0"/>
+              </a:rPr>
+              <a:t>)</a:t>
             </a:r>
           </a:p>
         </p:txBody>
       </p:sp>
       <p:sp>
         <p:nvSpPr>
-          <p:cNvPr id="4" name="Slide Number Placeholder 3"/>
+          <p:cNvPr id="4" name="Slide Number Placeholder 3">
+            <a:extLst>
+              <a:ext uri="{FF2B5EF4-FFF2-40B4-BE49-F238E27FC236}">
+                <a16:creationId xmlns:a16="http://schemas.microsoft.com/office/drawing/2014/main" id="{6DDBF39B-C591-4576-BDA4-9426D4CADA31}"/>
+              </a:ext>
+            </a:extLst>
+          </p:cNvPr>
           <p:cNvSpPr>
             <a:spLocks noGrp="1"/>
           </p:cNvSpPr>
@@ -27555,12 +27568,7 @@
             <p:ph type="sldNum" sz="quarter" idx="10"/>
           </p:nvPr>
         </p:nvSpPr>
-        <p:spPr>
-          <a:xfrm>
-            <a:off x="11938634" y="6594383"/>
-            <a:ext cx="131446" cy="153888"/>
-          </a:xfrm>
-        </p:spPr>
+        <p:spPr/>
         <p:txBody>
           <a:bodyPr/>
           <a:lstStyle/>
@@ -27582,7 +27590,7 @@
     </p:spTree>
     <p:extLst>
       <p:ext uri="{BB962C8B-B14F-4D97-AF65-F5344CB8AC3E}">
-        <p14:creationId xmlns:p14="http://schemas.microsoft.com/office/powerpoint/2010/main" val="2884320113"/>
+        <p14:creationId xmlns:p14="http://schemas.microsoft.com/office/powerpoint/2010/main" val="3000605741"/>
       </p:ext>
     </p:extLst>
   </p:cSld>
@@ -34317,61 +34325,6 @@
 </file>
 
 <file path=customXml/item2.xml><?xml version="1.0" encoding="utf-8"?>
-<?mso-contentType ?>
-<FormTemplates xmlns="http://schemas.microsoft.com/sharepoint/v3/contenttype/forms">
-  <Display>DocumentLibraryForm</Display>
-  <Edit>DocumentLibraryForm</Edit>
-  <New>DocumentLibraryForm</New>
-</FormTemplates>
-</file>
-
-<file path=customXml/item3.xml><?xml version="1.0" encoding="utf-8"?>
-<?mso-contentType ?>
-<spe:Receivers xmlns:spe="http://schemas.microsoft.com/sharepoint/events">
-  <Receiver>
-    <Name>Document ID Generator</Name>
-    <Synchronization>Synchronous</Synchronization>
-    <Type>10001</Type>
-    <SequenceNumber>1000</SequenceNumber>
-    <Assembly>Microsoft.Office.DocumentManagement, Version=14.0.0.0, Culture=neutral, PublicKeyToken=71e9bce111e9429c</Assembly>
-    <Class>Microsoft.Office.DocumentManagement.Internal.DocIdHandler</Class>
-    <Data/>
-    <Filter/>
-  </Receiver>
-  <Receiver>
-    <Name>Document ID Generator</Name>
-    <Synchronization>Synchronous</Synchronization>
-    <Type>10002</Type>
-    <SequenceNumber>1001</SequenceNumber>
-    <Assembly>Microsoft.Office.DocumentManagement, Version=14.0.0.0, Culture=neutral, PublicKeyToken=71e9bce111e9429c</Assembly>
-    <Class>Microsoft.Office.DocumentManagement.Internal.DocIdHandler</Class>
-    <Data/>
-    <Filter/>
-  </Receiver>
-  <Receiver>
-    <Name>Document ID Generator</Name>
-    <Synchronization>Synchronous</Synchronization>
-    <Type>10004</Type>
-    <SequenceNumber>1002</SequenceNumber>
-    <Assembly>Microsoft.Office.DocumentManagement, Version=14.0.0.0, Culture=neutral, PublicKeyToken=71e9bce111e9429c</Assembly>
-    <Class>Microsoft.Office.DocumentManagement.Internal.DocIdHandler</Class>
-    <Data/>
-    <Filter/>
-  </Receiver>
-  <Receiver>
-    <Name>Document ID Generator</Name>
-    <Synchronization>Synchronous</Synchronization>
-    <Type>10006</Type>
-    <SequenceNumber>1003</SequenceNumber>
-    <Assembly>Microsoft.Office.DocumentManagement, Version=14.0.0.0, Culture=neutral, PublicKeyToken=71e9bce111e9429c</Assembly>
-    <Class>Microsoft.Office.DocumentManagement.Internal.DocIdHandler</Class>
-    <Data/>
-    <Filter/>
-  </Receiver>
-</spe:Receivers>
-</file>
-
-<file path=customXml/item4.xml><?xml version="1.0" encoding="utf-8"?>
 <ct:contentTypeSchema xmlns:ct="http://schemas.microsoft.com/office/2006/metadata/contentType" xmlns:ma="http://schemas.microsoft.com/office/2006/metadata/properties/metaAttributes" ct:_="" ma:_="" ma:contentTypeName="Document" ma:contentTypeID="0x0101000F2EE08176DAB5419159A53B04F1A034" ma:contentTypeVersion="4" ma:contentTypeDescription="Create a new document." ma:contentTypeScope="" ma:versionID="8b05174801893035e92dad1421764737">
   <xsd:schema xmlns:xsd="http://www.w3.org/2001/XMLSchema" xmlns:xs="http://www.w3.org/2001/XMLSchema" xmlns:p="http://schemas.microsoft.com/office/2006/metadata/properties" xmlns:ns2="1709d302-aa1c-49f7-a43d-f13e34b813dc" xmlns:ns3="9714abc1-815c-4960-b75e-546bf8732ca3" targetNamespace="http://schemas.microsoft.com/office/2006/metadata/properties" ma:root="true" ma:fieldsID="af6e375d2bd7f689d83175b363f8ad17" ns2:_="" ns3:_="">
     <xsd:import namespace="1709d302-aa1c-49f7-a43d-f13e34b813dc"/>
@@ -34541,6 +34494,61 @@
 </ct:contentTypeSchema>
 </file>
 
+<file path=customXml/item3.xml><?xml version="1.0" encoding="utf-8"?>
+<?mso-contentType ?>
+<spe:Receivers xmlns:spe="http://schemas.microsoft.com/sharepoint/events">
+  <Receiver>
+    <Name>Document ID Generator</Name>
+    <Synchronization>Synchronous</Synchronization>
+    <Type>10001</Type>
+    <SequenceNumber>1000</SequenceNumber>
+    <Assembly>Microsoft.Office.DocumentManagement, Version=14.0.0.0, Culture=neutral, PublicKeyToken=71e9bce111e9429c</Assembly>
+    <Class>Microsoft.Office.DocumentManagement.Internal.DocIdHandler</Class>
+    <Data/>
+    <Filter/>
+  </Receiver>
+  <Receiver>
+    <Name>Document ID Generator</Name>
+    <Synchronization>Synchronous</Synchronization>
+    <Type>10002</Type>
+    <SequenceNumber>1001</SequenceNumber>
+    <Assembly>Microsoft.Office.DocumentManagement, Version=14.0.0.0, Culture=neutral, PublicKeyToken=71e9bce111e9429c</Assembly>
+    <Class>Microsoft.Office.DocumentManagement.Internal.DocIdHandler</Class>
+    <Data/>
+    <Filter/>
+  </Receiver>
+  <Receiver>
+    <Name>Document ID Generator</Name>
+    <Synchronization>Synchronous</Synchronization>
+    <Type>10004</Type>
+    <SequenceNumber>1002</SequenceNumber>
+    <Assembly>Microsoft.Office.DocumentManagement, Version=14.0.0.0, Culture=neutral, PublicKeyToken=71e9bce111e9429c</Assembly>
+    <Class>Microsoft.Office.DocumentManagement.Internal.DocIdHandler</Class>
+    <Data/>
+    <Filter/>
+  </Receiver>
+  <Receiver>
+    <Name>Document ID Generator</Name>
+    <Synchronization>Synchronous</Synchronization>
+    <Type>10006</Type>
+    <SequenceNumber>1003</SequenceNumber>
+    <Assembly>Microsoft.Office.DocumentManagement, Version=14.0.0.0, Culture=neutral, PublicKeyToken=71e9bce111e9429c</Assembly>
+    <Class>Microsoft.Office.DocumentManagement.Internal.DocIdHandler</Class>
+    <Data/>
+    <Filter/>
+  </Receiver>
+</spe:Receivers>
+</file>
+
+<file path=customXml/item4.xml><?xml version="1.0" encoding="utf-8"?>
+<?mso-contentType ?>
+<FormTemplates xmlns="http://schemas.microsoft.com/sharepoint/v3/contenttype/forms">
+  <Display>DocumentLibraryForm</Display>
+  <Edit>DocumentLibraryForm</Edit>
+  <New>DocumentLibraryForm</New>
+</FormTemplates>
+</file>
+
 <file path=customXml/itemProps1.xml><?xml version="1.0" encoding="utf-8"?>
 <ds:datastoreItem xmlns:ds="http://schemas.openxmlformats.org/officeDocument/2006/customXml" ds:itemID="{91EAC94F-0CB7-47E2-B1CC-A0F105248E94}">
   <ds:schemaRefs>
@@ -34559,22 +34567,6 @@
 </file>
 
 <file path=customXml/itemProps2.xml><?xml version="1.0" encoding="utf-8"?>
-<ds:datastoreItem xmlns:ds="http://schemas.openxmlformats.org/officeDocument/2006/customXml" ds:itemID="{F63C77B6-D79C-4692-AE58-9EB660BFA000}">
-  <ds:schemaRefs>
-    <ds:schemaRef ds:uri="http://schemas.microsoft.com/sharepoint/v3/contenttype/forms"/>
-  </ds:schemaRefs>
-</ds:datastoreItem>
-</file>
-
-<file path=customXml/itemProps3.xml><?xml version="1.0" encoding="utf-8"?>
-<ds:datastoreItem xmlns:ds="http://schemas.openxmlformats.org/officeDocument/2006/customXml" ds:itemID="{3B1E60DD-0AA5-4694-9679-4C10FD4D3910}">
-  <ds:schemaRefs>
-    <ds:schemaRef ds:uri="http://schemas.microsoft.com/sharepoint/events"/>
-  </ds:schemaRefs>
-</ds:datastoreItem>
-</file>
-
-<file path=customXml/itemProps4.xml><?xml version="1.0" encoding="utf-8"?>
 <ds:datastoreItem xmlns:ds="http://schemas.openxmlformats.org/officeDocument/2006/customXml" ds:itemID="{1C7DA38F-716D-4A29-8444-E5C76C2BE340}">
   <ds:schemaRefs>
     <ds:schemaRef ds:uri="http://schemas.microsoft.com/office/2006/metadata/contentType"/>
@@ -34591,4 +34583,20 @@
     <ds:schemaRef ds:uri="http://schemas.microsoft.com/internal/obd"/>
   </ds:schemaRefs>
 </ds:datastoreItem>
+</file>
+
+<file path=customXml/itemProps3.xml><?xml version="1.0" encoding="utf-8"?>
+<ds:datastoreItem xmlns:ds="http://schemas.openxmlformats.org/officeDocument/2006/customXml" ds:itemID="{3B1E60DD-0AA5-4694-9679-4C10FD4D3910}">
+  <ds:schemaRefs>
+    <ds:schemaRef ds:uri="http://schemas.microsoft.com/sharepoint/events"/>
+  </ds:schemaRefs>
+</ds:datastoreItem>
+</file>
+
+<file path=customXml/itemProps4.xml><?xml version="1.0" encoding="utf-8"?>
+<ds:datastoreItem xmlns:ds="http://schemas.openxmlformats.org/officeDocument/2006/customXml" ds:itemID="{F63C77B6-D79C-4692-AE58-9EB660BFA000}">
+  <ds:schemaRefs>
+    <ds:schemaRef ds:uri="http://schemas.microsoft.com/sharepoint/v3/contenttype/forms"/>
+  </ds:schemaRefs>
+</ds:datastoreItem>
 </file>
</xml_diff>